<commit_message>
added slides on rewriting
</commit_message>
<xml_diff>
--- a/slides/A-01-01-Proofs-Rewriting.pptx
+++ b/slides/A-01-01-Proofs-Rewriting.pptx
@@ -5,14 +5,19 @@
     <p:sldMasterId id="2147483649" r:id="rId1"/>
   </p:sldMasterIdLst>
   <p:notesMasterIdLst>
-    <p:notesMasterId r:id="rId4"/>
+    <p:notesMasterId r:id="rId9"/>
   </p:notesMasterIdLst>
   <p:handoutMasterIdLst>
-    <p:handoutMasterId r:id="rId5"/>
+    <p:handoutMasterId r:id="rId10"/>
   </p:handoutMasterIdLst>
   <p:sldIdLst>
     <p:sldId id="258" r:id="rId2"/>
     <p:sldId id="1911" r:id="rId3"/>
+    <p:sldId id="1912" r:id="rId4"/>
+    <p:sldId id="1915" r:id="rId5"/>
+    <p:sldId id="1916" r:id="rId6"/>
+    <p:sldId id="1913" r:id="rId7"/>
+    <p:sldId id="1914" r:id="rId8"/>
   </p:sldIdLst>
   <p:sldSz cx="9144000" cy="6858000" type="screen4x3"/>
   <p:notesSz cx="6858000" cy="9144000"/>
@@ -1131,6 +1136,901 @@
     <p:extLst>
       <p:ext uri="{BB962C8B-B14F-4D97-AF65-F5344CB8AC3E}">
         <p14:creationId xmlns:p14="http://schemas.microsoft.com/office/powerpoint/2010/main" val="2787644252"/>
+      </p:ext>
+    </p:extLst>
+  </p:cSld>
+  <p:clrMapOvr>
+    <a:masterClrMapping/>
+  </p:clrMapOvr>
+</p:notes>
+</file>
+
+<file path=ppt/notesSlides/notesSlide3.xml><?xml version="1.0" encoding="utf-8"?>
+<p:notes xmlns:a="http://schemas.openxmlformats.org/drawingml/2006/main" xmlns:r="http://schemas.openxmlformats.org/officeDocument/2006/relationships" xmlns:p="http://schemas.openxmlformats.org/presentationml/2006/main">
+  <p:cSld>
+    <p:spTree>
+      <p:nvGrpSpPr>
+        <p:cNvPr id="1" name="">
+          <a:extLst>
+            <a:ext uri="{FF2B5EF4-FFF2-40B4-BE49-F238E27FC236}">
+              <a16:creationId xmlns:a16="http://schemas.microsoft.com/office/drawing/2014/main" id="{027E1A11-045F-F1B3-4209-F36F5F69C5B5}"/>
+            </a:ext>
+          </a:extLst>
+        </p:cNvPr>
+        <p:cNvGrpSpPr/>
+        <p:nvPr/>
+      </p:nvGrpSpPr>
+      <p:grpSpPr>
+        <a:xfrm>
+          <a:off x="0" y="0"/>
+          <a:ext cx="0" cy="0"/>
+          <a:chOff x="0" y="0"/>
+          <a:chExt cx="0" cy="0"/>
+        </a:xfrm>
+      </p:grpSpPr>
+      <p:sp>
+        <p:nvSpPr>
+          <p:cNvPr id="2" name="Slide Image Placeholder 1">
+            <a:extLst>
+              <a:ext uri="{FF2B5EF4-FFF2-40B4-BE49-F238E27FC236}">
+                <a16:creationId xmlns:a16="http://schemas.microsoft.com/office/drawing/2014/main" id="{DBB3E258-FB4B-4354-72C5-8779FC3397B5}"/>
+              </a:ext>
+            </a:extLst>
+          </p:cNvPr>
+          <p:cNvSpPr>
+            <a:spLocks noGrp="1" noRot="1" noChangeAspect="1"/>
+          </p:cNvSpPr>
+          <p:nvPr>
+            <p:ph type="sldImg"/>
+          </p:nvPr>
+        </p:nvSpPr>
+        <p:spPr/>
+      </p:sp>
+      <p:sp>
+        <p:nvSpPr>
+          <p:cNvPr id="3" name="Notes Placeholder 2">
+            <a:extLst>
+              <a:ext uri="{FF2B5EF4-FFF2-40B4-BE49-F238E27FC236}">
+                <a16:creationId xmlns:a16="http://schemas.microsoft.com/office/drawing/2014/main" id="{FD27AB99-E837-4205-B8BF-408BC6D7C627}"/>
+              </a:ext>
+            </a:extLst>
+          </p:cNvPr>
+          <p:cNvSpPr>
+            <a:spLocks noGrp="1"/>
+          </p:cNvSpPr>
+          <p:nvPr>
+            <p:ph type="body" idx="1"/>
+          </p:nvPr>
+        </p:nvSpPr>
+        <p:spPr/>
+        <p:txBody>
+          <a:bodyPr/>
+          <a:lstStyle/>
+          <a:p>
+            <a:r>
+              <a:rPr lang="en-US" dirty="0">
+                <a:latin typeface="Tahoma" panose="020B0604030504040204" pitchFamily="34" charset="0"/>
+                <a:ea typeface="Tahoma" panose="020B0604030504040204" pitchFamily="34" charset="0"/>
+                <a:cs typeface="Tahoma" panose="020B0604030504040204" pitchFamily="34" charset="0"/>
+              </a:rPr>
+              <a:t>The framework that we will be using for this work is HAMR -- a model-driven development tool chain for high assurance embedded systems that emphasizes three layers of development:</a:t>
+            </a:r>
+          </a:p>
+          <a:p>
+            <a:endParaRPr lang="en-US" dirty="0">
+              <a:latin typeface="Tahoma" panose="020B0604030504040204" pitchFamily="34" charset="0"/>
+              <a:ea typeface="Tahoma" panose="020B0604030504040204" pitchFamily="34" charset="0"/>
+              <a:cs typeface="Tahoma" panose="020B0604030504040204" pitchFamily="34" charset="0"/>
+            </a:endParaRPr>
+          </a:p>
+          <a:p>
+            <a:r>
+              <a:rPr lang="en-US" dirty="0">
+                <a:latin typeface="Tahoma" panose="020B0604030504040204" pitchFamily="34" charset="0"/>
+                <a:ea typeface="Tahoma" panose="020B0604030504040204" pitchFamily="34" charset="0"/>
+                <a:cs typeface="Tahoma" panose="020B0604030504040204" pitchFamily="34" charset="0"/>
+              </a:rPr>
+              <a:t>Modeling, analysis and verification in the AADL modeling language, leveraging many tools in the AADL ecosystem</a:t>
+            </a:r>
+          </a:p>
+          <a:p>
+            <a:endParaRPr lang="en-US" dirty="0">
+              <a:latin typeface="Tahoma" panose="020B0604030504040204" pitchFamily="34" charset="0"/>
+              <a:ea typeface="Tahoma" panose="020B0604030504040204" pitchFamily="34" charset="0"/>
+              <a:cs typeface="Tahoma" panose="020B0604030504040204" pitchFamily="34" charset="0"/>
+            </a:endParaRPr>
+          </a:p>
+          <a:p>
+            <a:r>
+              <a:rPr lang="en-US" dirty="0">
+                <a:latin typeface="Tahoma" panose="020B0604030504040204" pitchFamily="34" charset="0"/>
+                <a:ea typeface="Tahoma" panose="020B0604030504040204" pitchFamily="34" charset="0"/>
+                <a:cs typeface="Tahoma" panose="020B0604030504040204" pitchFamily="34" charset="0"/>
+              </a:rPr>
+              <a:t>Development of component application logic in multiple languages include C and Slang (a safety-critical system of Scala with a contract verification framework, which can be translated to C)</a:t>
+            </a:r>
+          </a:p>
+          <a:p>
+            <a:endParaRPr lang="en-US" dirty="0">
+              <a:latin typeface="Tahoma" panose="020B0604030504040204" pitchFamily="34" charset="0"/>
+              <a:ea typeface="Tahoma" panose="020B0604030504040204" pitchFamily="34" charset="0"/>
+              <a:cs typeface="Tahoma" panose="020B0604030504040204" pitchFamily="34" charset="0"/>
+            </a:endParaRPr>
+          </a:p>
+          <a:p>
+            <a:r>
+              <a:rPr lang="en-US" dirty="0">
+                <a:latin typeface="Tahoma" panose="020B0604030504040204" pitchFamily="34" charset="0"/>
+                <a:ea typeface="Tahoma" panose="020B0604030504040204" pitchFamily="34" charset="0"/>
+                <a:cs typeface="Tahoma" panose="020B0604030504040204" pitchFamily="34" charset="0"/>
+              </a:rPr>
+              <a:t>Deployments on multiple platforms including seL4 verified microkernel.</a:t>
+            </a:r>
+          </a:p>
+          <a:p>
+            <a:endParaRPr lang="en-US" dirty="0">
+              <a:latin typeface="Tahoma" panose="020B0604030504040204" pitchFamily="34" charset="0"/>
+              <a:ea typeface="Tahoma" panose="020B0604030504040204" pitchFamily="34" charset="0"/>
+              <a:cs typeface="Tahoma" panose="020B0604030504040204" pitchFamily="34" charset="0"/>
+            </a:endParaRPr>
+          </a:p>
+        </p:txBody>
+      </p:sp>
+      <p:sp>
+        <p:nvSpPr>
+          <p:cNvPr id="4" name="Slide Number Placeholder 3">
+            <a:extLst>
+              <a:ext uri="{FF2B5EF4-FFF2-40B4-BE49-F238E27FC236}">
+                <a16:creationId xmlns:a16="http://schemas.microsoft.com/office/drawing/2014/main" id="{AAEFA10B-C829-7D54-9635-302793B426A6}"/>
+              </a:ext>
+            </a:extLst>
+          </p:cNvPr>
+          <p:cNvSpPr>
+            <a:spLocks noGrp="1"/>
+          </p:cNvSpPr>
+          <p:nvPr>
+            <p:ph type="sldNum" sz="quarter" idx="5"/>
+          </p:nvPr>
+        </p:nvSpPr>
+        <p:spPr/>
+        <p:txBody>
+          <a:bodyPr/>
+          <a:lstStyle/>
+          <a:p>
+            <a:pPr>
+              <a:defRPr/>
+            </a:pPr>
+            <a:fld id="{2BFE2475-28EF-9A44-97D3-D2287C00B1B1}" type="slidenum">
+              <a:rPr lang="en-US" smtClean="0"/>
+              <a:pPr>
+                <a:defRPr/>
+              </a:pPr>
+              <a:t>3</a:t>
+            </a:fld>
+            <a:endParaRPr lang="en-US"/>
+          </a:p>
+        </p:txBody>
+      </p:sp>
+    </p:spTree>
+    <p:extLst>
+      <p:ext uri="{BB962C8B-B14F-4D97-AF65-F5344CB8AC3E}">
+        <p14:creationId xmlns:p14="http://schemas.microsoft.com/office/powerpoint/2010/main" val="4195373305"/>
+      </p:ext>
+    </p:extLst>
+  </p:cSld>
+  <p:clrMapOvr>
+    <a:masterClrMapping/>
+  </p:clrMapOvr>
+</p:notes>
+</file>
+
+<file path=ppt/notesSlides/notesSlide4.xml><?xml version="1.0" encoding="utf-8"?>
+<p:notes xmlns:a="http://schemas.openxmlformats.org/drawingml/2006/main" xmlns:r="http://schemas.openxmlformats.org/officeDocument/2006/relationships" xmlns:p="http://schemas.openxmlformats.org/presentationml/2006/main">
+  <p:cSld>
+    <p:spTree>
+      <p:nvGrpSpPr>
+        <p:cNvPr id="1" name="">
+          <a:extLst>
+            <a:ext uri="{FF2B5EF4-FFF2-40B4-BE49-F238E27FC236}">
+              <a16:creationId xmlns:a16="http://schemas.microsoft.com/office/drawing/2014/main" id="{A6907F6C-4918-D1CA-3770-E2713BABD1BC}"/>
+            </a:ext>
+          </a:extLst>
+        </p:cNvPr>
+        <p:cNvGrpSpPr/>
+        <p:nvPr/>
+      </p:nvGrpSpPr>
+      <p:grpSpPr>
+        <a:xfrm>
+          <a:off x="0" y="0"/>
+          <a:ext cx="0" cy="0"/>
+          <a:chOff x="0" y="0"/>
+          <a:chExt cx="0" cy="0"/>
+        </a:xfrm>
+      </p:grpSpPr>
+      <p:sp>
+        <p:nvSpPr>
+          <p:cNvPr id="2" name="Slide Image Placeholder 1">
+            <a:extLst>
+              <a:ext uri="{FF2B5EF4-FFF2-40B4-BE49-F238E27FC236}">
+                <a16:creationId xmlns:a16="http://schemas.microsoft.com/office/drawing/2014/main" id="{939A8582-1691-4AC7-475C-5550AF06D8ED}"/>
+              </a:ext>
+            </a:extLst>
+          </p:cNvPr>
+          <p:cNvSpPr>
+            <a:spLocks noGrp="1" noRot="1" noChangeAspect="1"/>
+          </p:cNvSpPr>
+          <p:nvPr>
+            <p:ph type="sldImg"/>
+          </p:nvPr>
+        </p:nvSpPr>
+        <p:spPr/>
+      </p:sp>
+      <p:sp>
+        <p:nvSpPr>
+          <p:cNvPr id="3" name="Notes Placeholder 2">
+            <a:extLst>
+              <a:ext uri="{FF2B5EF4-FFF2-40B4-BE49-F238E27FC236}">
+                <a16:creationId xmlns:a16="http://schemas.microsoft.com/office/drawing/2014/main" id="{2F13BD15-7627-EA4E-D18B-70419D8FDDBE}"/>
+              </a:ext>
+            </a:extLst>
+          </p:cNvPr>
+          <p:cNvSpPr>
+            <a:spLocks noGrp="1"/>
+          </p:cNvSpPr>
+          <p:nvPr>
+            <p:ph type="body" idx="1"/>
+          </p:nvPr>
+        </p:nvSpPr>
+        <p:spPr/>
+        <p:txBody>
+          <a:bodyPr/>
+          <a:lstStyle/>
+          <a:p>
+            <a:r>
+              <a:rPr lang="en-US" dirty="0">
+                <a:latin typeface="Tahoma" panose="020B0604030504040204" pitchFamily="34" charset="0"/>
+                <a:ea typeface="Tahoma" panose="020B0604030504040204" pitchFamily="34" charset="0"/>
+                <a:cs typeface="Tahoma" panose="020B0604030504040204" pitchFamily="34" charset="0"/>
+              </a:rPr>
+              <a:t>The framework that we will be using for this work is HAMR -- a model-driven development tool chain for high assurance embedded systems that emphasizes three layers of development:</a:t>
+            </a:r>
+          </a:p>
+          <a:p>
+            <a:endParaRPr lang="en-US" dirty="0">
+              <a:latin typeface="Tahoma" panose="020B0604030504040204" pitchFamily="34" charset="0"/>
+              <a:ea typeface="Tahoma" panose="020B0604030504040204" pitchFamily="34" charset="0"/>
+              <a:cs typeface="Tahoma" panose="020B0604030504040204" pitchFamily="34" charset="0"/>
+            </a:endParaRPr>
+          </a:p>
+          <a:p>
+            <a:r>
+              <a:rPr lang="en-US" dirty="0">
+                <a:latin typeface="Tahoma" panose="020B0604030504040204" pitchFamily="34" charset="0"/>
+                <a:ea typeface="Tahoma" panose="020B0604030504040204" pitchFamily="34" charset="0"/>
+                <a:cs typeface="Tahoma" panose="020B0604030504040204" pitchFamily="34" charset="0"/>
+              </a:rPr>
+              <a:t>Modeling, analysis and verification in the AADL modeling language, leveraging many tools in the AADL ecosystem</a:t>
+            </a:r>
+          </a:p>
+          <a:p>
+            <a:endParaRPr lang="en-US" dirty="0">
+              <a:latin typeface="Tahoma" panose="020B0604030504040204" pitchFamily="34" charset="0"/>
+              <a:ea typeface="Tahoma" panose="020B0604030504040204" pitchFamily="34" charset="0"/>
+              <a:cs typeface="Tahoma" panose="020B0604030504040204" pitchFamily="34" charset="0"/>
+            </a:endParaRPr>
+          </a:p>
+          <a:p>
+            <a:r>
+              <a:rPr lang="en-US" dirty="0">
+                <a:latin typeface="Tahoma" panose="020B0604030504040204" pitchFamily="34" charset="0"/>
+                <a:ea typeface="Tahoma" panose="020B0604030504040204" pitchFamily="34" charset="0"/>
+                <a:cs typeface="Tahoma" panose="020B0604030504040204" pitchFamily="34" charset="0"/>
+              </a:rPr>
+              <a:t>Development of component application logic in multiple languages include C and Slang (a safety-critical system of Scala with a contract verification framework, which can be translated to C)</a:t>
+            </a:r>
+          </a:p>
+          <a:p>
+            <a:endParaRPr lang="en-US" dirty="0">
+              <a:latin typeface="Tahoma" panose="020B0604030504040204" pitchFamily="34" charset="0"/>
+              <a:ea typeface="Tahoma" panose="020B0604030504040204" pitchFamily="34" charset="0"/>
+              <a:cs typeface="Tahoma" panose="020B0604030504040204" pitchFamily="34" charset="0"/>
+            </a:endParaRPr>
+          </a:p>
+          <a:p>
+            <a:r>
+              <a:rPr lang="en-US" dirty="0">
+                <a:latin typeface="Tahoma" panose="020B0604030504040204" pitchFamily="34" charset="0"/>
+                <a:ea typeface="Tahoma" panose="020B0604030504040204" pitchFamily="34" charset="0"/>
+                <a:cs typeface="Tahoma" panose="020B0604030504040204" pitchFamily="34" charset="0"/>
+              </a:rPr>
+              <a:t>Deployments on multiple platforms including seL4 verified microkernel.</a:t>
+            </a:r>
+          </a:p>
+          <a:p>
+            <a:endParaRPr lang="en-US" dirty="0">
+              <a:latin typeface="Tahoma" panose="020B0604030504040204" pitchFamily="34" charset="0"/>
+              <a:ea typeface="Tahoma" panose="020B0604030504040204" pitchFamily="34" charset="0"/>
+              <a:cs typeface="Tahoma" panose="020B0604030504040204" pitchFamily="34" charset="0"/>
+            </a:endParaRPr>
+          </a:p>
+        </p:txBody>
+      </p:sp>
+      <p:sp>
+        <p:nvSpPr>
+          <p:cNvPr id="4" name="Slide Number Placeholder 3">
+            <a:extLst>
+              <a:ext uri="{FF2B5EF4-FFF2-40B4-BE49-F238E27FC236}">
+                <a16:creationId xmlns:a16="http://schemas.microsoft.com/office/drawing/2014/main" id="{8D98BF66-5F68-F887-CAB0-729216B982AD}"/>
+              </a:ext>
+            </a:extLst>
+          </p:cNvPr>
+          <p:cNvSpPr>
+            <a:spLocks noGrp="1"/>
+          </p:cNvSpPr>
+          <p:nvPr>
+            <p:ph type="sldNum" sz="quarter" idx="5"/>
+          </p:nvPr>
+        </p:nvSpPr>
+        <p:spPr/>
+        <p:txBody>
+          <a:bodyPr/>
+          <a:lstStyle/>
+          <a:p>
+            <a:pPr>
+              <a:defRPr/>
+            </a:pPr>
+            <a:fld id="{2BFE2475-28EF-9A44-97D3-D2287C00B1B1}" type="slidenum">
+              <a:rPr lang="en-US" smtClean="0"/>
+              <a:pPr>
+                <a:defRPr/>
+              </a:pPr>
+              <a:t>4</a:t>
+            </a:fld>
+            <a:endParaRPr lang="en-US"/>
+          </a:p>
+        </p:txBody>
+      </p:sp>
+    </p:spTree>
+    <p:extLst>
+      <p:ext uri="{BB962C8B-B14F-4D97-AF65-F5344CB8AC3E}">
+        <p14:creationId xmlns:p14="http://schemas.microsoft.com/office/powerpoint/2010/main" val="1396993584"/>
+      </p:ext>
+    </p:extLst>
+  </p:cSld>
+  <p:clrMapOvr>
+    <a:masterClrMapping/>
+  </p:clrMapOvr>
+</p:notes>
+</file>
+
+<file path=ppt/notesSlides/notesSlide5.xml><?xml version="1.0" encoding="utf-8"?>
+<p:notes xmlns:a="http://schemas.openxmlformats.org/drawingml/2006/main" xmlns:r="http://schemas.openxmlformats.org/officeDocument/2006/relationships" xmlns:p="http://schemas.openxmlformats.org/presentationml/2006/main">
+  <p:cSld>
+    <p:spTree>
+      <p:nvGrpSpPr>
+        <p:cNvPr id="1" name="">
+          <a:extLst>
+            <a:ext uri="{FF2B5EF4-FFF2-40B4-BE49-F238E27FC236}">
+              <a16:creationId xmlns:a16="http://schemas.microsoft.com/office/drawing/2014/main" id="{AD46BCF6-0CF1-9A83-094D-26882F4F3AA5}"/>
+            </a:ext>
+          </a:extLst>
+        </p:cNvPr>
+        <p:cNvGrpSpPr/>
+        <p:nvPr/>
+      </p:nvGrpSpPr>
+      <p:grpSpPr>
+        <a:xfrm>
+          <a:off x="0" y="0"/>
+          <a:ext cx="0" cy="0"/>
+          <a:chOff x="0" y="0"/>
+          <a:chExt cx="0" cy="0"/>
+        </a:xfrm>
+      </p:grpSpPr>
+      <p:sp>
+        <p:nvSpPr>
+          <p:cNvPr id="2" name="Slide Image Placeholder 1">
+            <a:extLst>
+              <a:ext uri="{FF2B5EF4-FFF2-40B4-BE49-F238E27FC236}">
+                <a16:creationId xmlns:a16="http://schemas.microsoft.com/office/drawing/2014/main" id="{ED9B7B27-7A8E-1037-08AF-FD86EDA07403}"/>
+              </a:ext>
+            </a:extLst>
+          </p:cNvPr>
+          <p:cNvSpPr>
+            <a:spLocks noGrp="1" noRot="1" noChangeAspect="1"/>
+          </p:cNvSpPr>
+          <p:nvPr>
+            <p:ph type="sldImg"/>
+          </p:nvPr>
+        </p:nvSpPr>
+        <p:spPr/>
+      </p:sp>
+      <p:sp>
+        <p:nvSpPr>
+          <p:cNvPr id="3" name="Notes Placeholder 2">
+            <a:extLst>
+              <a:ext uri="{FF2B5EF4-FFF2-40B4-BE49-F238E27FC236}">
+                <a16:creationId xmlns:a16="http://schemas.microsoft.com/office/drawing/2014/main" id="{61578DB5-A3EE-1E47-E7D6-87C2F787E3A0}"/>
+              </a:ext>
+            </a:extLst>
+          </p:cNvPr>
+          <p:cNvSpPr>
+            <a:spLocks noGrp="1"/>
+          </p:cNvSpPr>
+          <p:nvPr>
+            <p:ph type="body" idx="1"/>
+          </p:nvPr>
+        </p:nvSpPr>
+        <p:spPr/>
+        <p:txBody>
+          <a:bodyPr/>
+          <a:lstStyle/>
+          <a:p>
+            <a:r>
+              <a:rPr lang="en-US" dirty="0">
+                <a:latin typeface="Tahoma" panose="020B0604030504040204" pitchFamily="34" charset="0"/>
+                <a:ea typeface="Tahoma" panose="020B0604030504040204" pitchFamily="34" charset="0"/>
+                <a:cs typeface="Tahoma" panose="020B0604030504040204" pitchFamily="34" charset="0"/>
+              </a:rPr>
+              <a:t>The framework that we will be using for this work is HAMR -- a model-driven development tool chain for high assurance embedded systems that emphasizes three layers of development:</a:t>
+            </a:r>
+          </a:p>
+          <a:p>
+            <a:endParaRPr lang="en-US" dirty="0">
+              <a:latin typeface="Tahoma" panose="020B0604030504040204" pitchFamily="34" charset="0"/>
+              <a:ea typeface="Tahoma" panose="020B0604030504040204" pitchFamily="34" charset="0"/>
+              <a:cs typeface="Tahoma" panose="020B0604030504040204" pitchFamily="34" charset="0"/>
+            </a:endParaRPr>
+          </a:p>
+          <a:p>
+            <a:r>
+              <a:rPr lang="en-US" dirty="0">
+                <a:latin typeface="Tahoma" panose="020B0604030504040204" pitchFamily="34" charset="0"/>
+                <a:ea typeface="Tahoma" panose="020B0604030504040204" pitchFamily="34" charset="0"/>
+                <a:cs typeface="Tahoma" panose="020B0604030504040204" pitchFamily="34" charset="0"/>
+              </a:rPr>
+              <a:t>Modeling, analysis and verification in the AADL modeling language, leveraging many tools in the AADL ecosystem</a:t>
+            </a:r>
+          </a:p>
+          <a:p>
+            <a:endParaRPr lang="en-US" dirty="0">
+              <a:latin typeface="Tahoma" panose="020B0604030504040204" pitchFamily="34" charset="0"/>
+              <a:ea typeface="Tahoma" panose="020B0604030504040204" pitchFamily="34" charset="0"/>
+              <a:cs typeface="Tahoma" panose="020B0604030504040204" pitchFamily="34" charset="0"/>
+            </a:endParaRPr>
+          </a:p>
+          <a:p>
+            <a:r>
+              <a:rPr lang="en-US" dirty="0">
+                <a:latin typeface="Tahoma" panose="020B0604030504040204" pitchFamily="34" charset="0"/>
+                <a:ea typeface="Tahoma" panose="020B0604030504040204" pitchFamily="34" charset="0"/>
+                <a:cs typeface="Tahoma" panose="020B0604030504040204" pitchFamily="34" charset="0"/>
+              </a:rPr>
+              <a:t>Development of component application logic in multiple languages include C and Slang (a safety-critical system of Scala with a contract verification framework, which can be translated to C)</a:t>
+            </a:r>
+          </a:p>
+          <a:p>
+            <a:endParaRPr lang="en-US" dirty="0">
+              <a:latin typeface="Tahoma" panose="020B0604030504040204" pitchFamily="34" charset="0"/>
+              <a:ea typeface="Tahoma" panose="020B0604030504040204" pitchFamily="34" charset="0"/>
+              <a:cs typeface="Tahoma" panose="020B0604030504040204" pitchFamily="34" charset="0"/>
+            </a:endParaRPr>
+          </a:p>
+          <a:p>
+            <a:r>
+              <a:rPr lang="en-US" dirty="0">
+                <a:latin typeface="Tahoma" panose="020B0604030504040204" pitchFamily="34" charset="0"/>
+                <a:ea typeface="Tahoma" panose="020B0604030504040204" pitchFamily="34" charset="0"/>
+                <a:cs typeface="Tahoma" panose="020B0604030504040204" pitchFamily="34" charset="0"/>
+              </a:rPr>
+              <a:t>Deployments on multiple platforms including seL4 verified microkernel.</a:t>
+            </a:r>
+          </a:p>
+          <a:p>
+            <a:endParaRPr lang="en-US" dirty="0">
+              <a:latin typeface="Tahoma" panose="020B0604030504040204" pitchFamily="34" charset="0"/>
+              <a:ea typeface="Tahoma" panose="020B0604030504040204" pitchFamily="34" charset="0"/>
+              <a:cs typeface="Tahoma" panose="020B0604030504040204" pitchFamily="34" charset="0"/>
+            </a:endParaRPr>
+          </a:p>
+        </p:txBody>
+      </p:sp>
+      <p:sp>
+        <p:nvSpPr>
+          <p:cNvPr id="4" name="Slide Number Placeholder 3">
+            <a:extLst>
+              <a:ext uri="{FF2B5EF4-FFF2-40B4-BE49-F238E27FC236}">
+                <a16:creationId xmlns:a16="http://schemas.microsoft.com/office/drawing/2014/main" id="{CC301B6E-01DE-8E4C-E96A-45ED35D4D928}"/>
+              </a:ext>
+            </a:extLst>
+          </p:cNvPr>
+          <p:cNvSpPr>
+            <a:spLocks noGrp="1"/>
+          </p:cNvSpPr>
+          <p:nvPr>
+            <p:ph type="sldNum" sz="quarter" idx="5"/>
+          </p:nvPr>
+        </p:nvSpPr>
+        <p:spPr/>
+        <p:txBody>
+          <a:bodyPr/>
+          <a:lstStyle/>
+          <a:p>
+            <a:pPr>
+              <a:defRPr/>
+            </a:pPr>
+            <a:fld id="{2BFE2475-28EF-9A44-97D3-D2287C00B1B1}" type="slidenum">
+              <a:rPr lang="en-US" smtClean="0"/>
+              <a:pPr>
+                <a:defRPr/>
+              </a:pPr>
+              <a:t>5</a:t>
+            </a:fld>
+            <a:endParaRPr lang="en-US"/>
+          </a:p>
+        </p:txBody>
+      </p:sp>
+    </p:spTree>
+    <p:extLst>
+      <p:ext uri="{BB962C8B-B14F-4D97-AF65-F5344CB8AC3E}">
+        <p14:creationId xmlns:p14="http://schemas.microsoft.com/office/powerpoint/2010/main" val="1188465803"/>
+      </p:ext>
+    </p:extLst>
+  </p:cSld>
+  <p:clrMapOvr>
+    <a:masterClrMapping/>
+  </p:clrMapOvr>
+</p:notes>
+</file>
+
+<file path=ppt/notesSlides/notesSlide6.xml><?xml version="1.0" encoding="utf-8"?>
+<p:notes xmlns:a="http://schemas.openxmlformats.org/drawingml/2006/main" xmlns:r="http://schemas.openxmlformats.org/officeDocument/2006/relationships" xmlns:p="http://schemas.openxmlformats.org/presentationml/2006/main">
+  <p:cSld>
+    <p:spTree>
+      <p:nvGrpSpPr>
+        <p:cNvPr id="1" name="">
+          <a:extLst>
+            <a:ext uri="{FF2B5EF4-FFF2-40B4-BE49-F238E27FC236}">
+              <a16:creationId xmlns:a16="http://schemas.microsoft.com/office/drawing/2014/main" id="{EAC4C3D4-6B0E-E6D0-D0DD-E3A232D199A2}"/>
+            </a:ext>
+          </a:extLst>
+        </p:cNvPr>
+        <p:cNvGrpSpPr/>
+        <p:nvPr/>
+      </p:nvGrpSpPr>
+      <p:grpSpPr>
+        <a:xfrm>
+          <a:off x="0" y="0"/>
+          <a:ext cx="0" cy="0"/>
+          <a:chOff x="0" y="0"/>
+          <a:chExt cx="0" cy="0"/>
+        </a:xfrm>
+      </p:grpSpPr>
+      <p:sp>
+        <p:nvSpPr>
+          <p:cNvPr id="2" name="Slide Image Placeholder 1">
+            <a:extLst>
+              <a:ext uri="{FF2B5EF4-FFF2-40B4-BE49-F238E27FC236}">
+                <a16:creationId xmlns:a16="http://schemas.microsoft.com/office/drawing/2014/main" id="{A8DB0941-D377-3CEF-0C96-4FAD678CB47F}"/>
+              </a:ext>
+            </a:extLst>
+          </p:cNvPr>
+          <p:cNvSpPr>
+            <a:spLocks noGrp="1" noRot="1" noChangeAspect="1"/>
+          </p:cNvSpPr>
+          <p:nvPr>
+            <p:ph type="sldImg"/>
+          </p:nvPr>
+        </p:nvSpPr>
+        <p:spPr/>
+      </p:sp>
+      <p:sp>
+        <p:nvSpPr>
+          <p:cNvPr id="3" name="Notes Placeholder 2">
+            <a:extLst>
+              <a:ext uri="{FF2B5EF4-FFF2-40B4-BE49-F238E27FC236}">
+                <a16:creationId xmlns:a16="http://schemas.microsoft.com/office/drawing/2014/main" id="{C8D15AC4-5598-738B-567F-AA2582560624}"/>
+              </a:ext>
+            </a:extLst>
+          </p:cNvPr>
+          <p:cNvSpPr>
+            <a:spLocks noGrp="1"/>
+          </p:cNvSpPr>
+          <p:nvPr>
+            <p:ph type="body" idx="1"/>
+          </p:nvPr>
+        </p:nvSpPr>
+        <p:spPr/>
+        <p:txBody>
+          <a:bodyPr/>
+          <a:lstStyle/>
+          <a:p>
+            <a:r>
+              <a:rPr lang="en-US" dirty="0">
+                <a:latin typeface="Tahoma" panose="020B0604030504040204" pitchFamily="34" charset="0"/>
+                <a:ea typeface="Tahoma" panose="020B0604030504040204" pitchFamily="34" charset="0"/>
+                <a:cs typeface="Tahoma" panose="020B0604030504040204" pitchFamily="34" charset="0"/>
+              </a:rPr>
+              <a:t>The framework that we will be using for this work is HAMR -- a model-driven development tool chain for high assurance embedded systems that emphasizes three layers of development:</a:t>
+            </a:r>
+          </a:p>
+          <a:p>
+            <a:endParaRPr lang="en-US" dirty="0">
+              <a:latin typeface="Tahoma" panose="020B0604030504040204" pitchFamily="34" charset="0"/>
+              <a:ea typeface="Tahoma" panose="020B0604030504040204" pitchFamily="34" charset="0"/>
+              <a:cs typeface="Tahoma" panose="020B0604030504040204" pitchFamily="34" charset="0"/>
+            </a:endParaRPr>
+          </a:p>
+          <a:p>
+            <a:r>
+              <a:rPr lang="en-US" dirty="0">
+                <a:latin typeface="Tahoma" panose="020B0604030504040204" pitchFamily="34" charset="0"/>
+                <a:ea typeface="Tahoma" panose="020B0604030504040204" pitchFamily="34" charset="0"/>
+                <a:cs typeface="Tahoma" panose="020B0604030504040204" pitchFamily="34" charset="0"/>
+              </a:rPr>
+              <a:t>Modeling, analysis and verification in the AADL modeling language, leveraging many tools in the AADL ecosystem</a:t>
+            </a:r>
+          </a:p>
+          <a:p>
+            <a:endParaRPr lang="en-US" dirty="0">
+              <a:latin typeface="Tahoma" panose="020B0604030504040204" pitchFamily="34" charset="0"/>
+              <a:ea typeface="Tahoma" panose="020B0604030504040204" pitchFamily="34" charset="0"/>
+              <a:cs typeface="Tahoma" panose="020B0604030504040204" pitchFamily="34" charset="0"/>
+            </a:endParaRPr>
+          </a:p>
+          <a:p>
+            <a:r>
+              <a:rPr lang="en-US" dirty="0">
+                <a:latin typeface="Tahoma" panose="020B0604030504040204" pitchFamily="34" charset="0"/>
+                <a:ea typeface="Tahoma" panose="020B0604030504040204" pitchFamily="34" charset="0"/>
+                <a:cs typeface="Tahoma" panose="020B0604030504040204" pitchFamily="34" charset="0"/>
+              </a:rPr>
+              <a:t>Development of component application logic in multiple languages include C and Slang (a safety-critical system of Scala with a contract verification framework, which can be translated to C)</a:t>
+            </a:r>
+          </a:p>
+          <a:p>
+            <a:endParaRPr lang="en-US" dirty="0">
+              <a:latin typeface="Tahoma" panose="020B0604030504040204" pitchFamily="34" charset="0"/>
+              <a:ea typeface="Tahoma" panose="020B0604030504040204" pitchFamily="34" charset="0"/>
+              <a:cs typeface="Tahoma" panose="020B0604030504040204" pitchFamily="34" charset="0"/>
+            </a:endParaRPr>
+          </a:p>
+          <a:p>
+            <a:r>
+              <a:rPr lang="en-US" dirty="0">
+                <a:latin typeface="Tahoma" panose="020B0604030504040204" pitchFamily="34" charset="0"/>
+                <a:ea typeface="Tahoma" panose="020B0604030504040204" pitchFamily="34" charset="0"/>
+                <a:cs typeface="Tahoma" panose="020B0604030504040204" pitchFamily="34" charset="0"/>
+              </a:rPr>
+              <a:t>Deployments on multiple platforms including seL4 verified microkernel.</a:t>
+            </a:r>
+          </a:p>
+          <a:p>
+            <a:endParaRPr lang="en-US" dirty="0">
+              <a:latin typeface="Tahoma" panose="020B0604030504040204" pitchFamily="34" charset="0"/>
+              <a:ea typeface="Tahoma" panose="020B0604030504040204" pitchFamily="34" charset="0"/>
+              <a:cs typeface="Tahoma" panose="020B0604030504040204" pitchFamily="34" charset="0"/>
+            </a:endParaRPr>
+          </a:p>
+        </p:txBody>
+      </p:sp>
+      <p:sp>
+        <p:nvSpPr>
+          <p:cNvPr id="4" name="Slide Number Placeholder 3">
+            <a:extLst>
+              <a:ext uri="{FF2B5EF4-FFF2-40B4-BE49-F238E27FC236}">
+                <a16:creationId xmlns:a16="http://schemas.microsoft.com/office/drawing/2014/main" id="{A056D479-5898-F67D-B7B6-C92F15AF9F0C}"/>
+              </a:ext>
+            </a:extLst>
+          </p:cNvPr>
+          <p:cNvSpPr>
+            <a:spLocks noGrp="1"/>
+          </p:cNvSpPr>
+          <p:nvPr>
+            <p:ph type="sldNum" sz="quarter" idx="5"/>
+          </p:nvPr>
+        </p:nvSpPr>
+        <p:spPr/>
+        <p:txBody>
+          <a:bodyPr/>
+          <a:lstStyle/>
+          <a:p>
+            <a:pPr>
+              <a:defRPr/>
+            </a:pPr>
+            <a:fld id="{2BFE2475-28EF-9A44-97D3-D2287C00B1B1}" type="slidenum">
+              <a:rPr lang="en-US" smtClean="0"/>
+              <a:pPr>
+                <a:defRPr/>
+              </a:pPr>
+              <a:t>6</a:t>
+            </a:fld>
+            <a:endParaRPr lang="en-US"/>
+          </a:p>
+        </p:txBody>
+      </p:sp>
+    </p:spTree>
+    <p:extLst>
+      <p:ext uri="{BB962C8B-B14F-4D97-AF65-F5344CB8AC3E}">
+        <p14:creationId xmlns:p14="http://schemas.microsoft.com/office/powerpoint/2010/main" val="472671827"/>
+      </p:ext>
+    </p:extLst>
+  </p:cSld>
+  <p:clrMapOvr>
+    <a:masterClrMapping/>
+  </p:clrMapOvr>
+</p:notes>
+</file>
+
+<file path=ppt/notesSlides/notesSlide7.xml><?xml version="1.0" encoding="utf-8"?>
+<p:notes xmlns:a="http://schemas.openxmlformats.org/drawingml/2006/main" xmlns:r="http://schemas.openxmlformats.org/officeDocument/2006/relationships" xmlns:p="http://schemas.openxmlformats.org/presentationml/2006/main">
+  <p:cSld>
+    <p:spTree>
+      <p:nvGrpSpPr>
+        <p:cNvPr id="1" name="">
+          <a:extLst>
+            <a:ext uri="{FF2B5EF4-FFF2-40B4-BE49-F238E27FC236}">
+              <a16:creationId xmlns:a16="http://schemas.microsoft.com/office/drawing/2014/main" id="{DC63C6E6-084C-CACE-3377-F6F1401F7D68}"/>
+            </a:ext>
+          </a:extLst>
+        </p:cNvPr>
+        <p:cNvGrpSpPr/>
+        <p:nvPr/>
+      </p:nvGrpSpPr>
+      <p:grpSpPr>
+        <a:xfrm>
+          <a:off x="0" y="0"/>
+          <a:ext cx="0" cy="0"/>
+          <a:chOff x="0" y="0"/>
+          <a:chExt cx="0" cy="0"/>
+        </a:xfrm>
+      </p:grpSpPr>
+      <p:sp>
+        <p:nvSpPr>
+          <p:cNvPr id="2" name="Slide Image Placeholder 1">
+            <a:extLst>
+              <a:ext uri="{FF2B5EF4-FFF2-40B4-BE49-F238E27FC236}">
+                <a16:creationId xmlns:a16="http://schemas.microsoft.com/office/drawing/2014/main" id="{0FAFE3DB-24A1-3A32-D985-D4C3BDF5B348}"/>
+              </a:ext>
+            </a:extLst>
+          </p:cNvPr>
+          <p:cNvSpPr>
+            <a:spLocks noGrp="1" noRot="1" noChangeAspect="1"/>
+          </p:cNvSpPr>
+          <p:nvPr>
+            <p:ph type="sldImg"/>
+          </p:nvPr>
+        </p:nvSpPr>
+        <p:spPr/>
+      </p:sp>
+      <p:sp>
+        <p:nvSpPr>
+          <p:cNvPr id="3" name="Notes Placeholder 2">
+            <a:extLst>
+              <a:ext uri="{FF2B5EF4-FFF2-40B4-BE49-F238E27FC236}">
+                <a16:creationId xmlns:a16="http://schemas.microsoft.com/office/drawing/2014/main" id="{60FBB5FB-8CAA-1907-DE5A-AF81AE95CAD9}"/>
+              </a:ext>
+            </a:extLst>
+          </p:cNvPr>
+          <p:cNvSpPr>
+            <a:spLocks noGrp="1"/>
+          </p:cNvSpPr>
+          <p:nvPr>
+            <p:ph type="body" idx="1"/>
+          </p:nvPr>
+        </p:nvSpPr>
+        <p:spPr/>
+        <p:txBody>
+          <a:bodyPr/>
+          <a:lstStyle/>
+          <a:p>
+            <a:r>
+              <a:rPr lang="en-US" dirty="0">
+                <a:latin typeface="Tahoma" panose="020B0604030504040204" pitchFamily="34" charset="0"/>
+                <a:ea typeface="Tahoma" panose="020B0604030504040204" pitchFamily="34" charset="0"/>
+                <a:cs typeface="Tahoma" panose="020B0604030504040204" pitchFamily="34" charset="0"/>
+              </a:rPr>
+              <a:t>The framework that we will be using for this work is HAMR -- a model-driven development tool chain for high assurance embedded systems that emphasizes three layers of development:</a:t>
+            </a:r>
+          </a:p>
+          <a:p>
+            <a:endParaRPr lang="en-US" dirty="0">
+              <a:latin typeface="Tahoma" panose="020B0604030504040204" pitchFamily="34" charset="0"/>
+              <a:ea typeface="Tahoma" panose="020B0604030504040204" pitchFamily="34" charset="0"/>
+              <a:cs typeface="Tahoma" panose="020B0604030504040204" pitchFamily="34" charset="0"/>
+            </a:endParaRPr>
+          </a:p>
+          <a:p>
+            <a:r>
+              <a:rPr lang="en-US" dirty="0">
+                <a:latin typeface="Tahoma" panose="020B0604030504040204" pitchFamily="34" charset="0"/>
+                <a:ea typeface="Tahoma" panose="020B0604030504040204" pitchFamily="34" charset="0"/>
+                <a:cs typeface="Tahoma" panose="020B0604030504040204" pitchFamily="34" charset="0"/>
+              </a:rPr>
+              <a:t>Modeling, analysis and verification in the AADL modeling language, leveraging many tools in the AADL ecosystem</a:t>
+            </a:r>
+          </a:p>
+          <a:p>
+            <a:endParaRPr lang="en-US" dirty="0">
+              <a:latin typeface="Tahoma" panose="020B0604030504040204" pitchFamily="34" charset="0"/>
+              <a:ea typeface="Tahoma" panose="020B0604030504040204" pitchFamily="34" charset="0"/>
+              <a:cs typeface="Tahoma" panose="020B0604030504040204" pitchFamily="34" charset="0"/>
+            </a:endParaRPr>
+          </a:p>
+          <a:p>
+            <a:r>
+              <a:rPr lang="en-US" dirty="0">
+                <a:latin typeface="Tahoma" panose="020B0604030504040204" pitchFamily="34" charset="0"/>
+                <a:ea typeface="Tahoma" panose="020B0604030504040204" pitchFamily="34" charset="0"/>
+                <a:cs typeface="Tahoma" panose="020B0604030504040204" pitchFamily="34" charset="0"/>
+              </a:rPr>
+              <a:t>Development of component application logic in multiple languages include C and Slang (a safety-critical system of Scala with a contract verification framework, which can be translated to C)</a:t>
+            </a:r>
+          </a:p>
+          <a:p>
+            <a:endParaRPr lang="en-US" dirty="0">
+              <a:latin typeface="Tahoma" panose="020B0604030504040204" pitchFamily="34" charset="0"/>
+              <a:ea typeface="Tahoma" panose="020B0604030504040204" pitchFamily="34" charset="0"/>
+              <a:cs typeface="Tahoma" panose="020B0604030504040204" pitchFamily="34" charset="0"/>
+            </a:endParaRPr>
+          </a:p>
+          <a:p>
+            <a:r>
+              <a:rPr lang="en-US" dirty="0">
+                <a:latin typeface="Tahoma" panose="020B0604030504040204" pitchFamily="34" charset="0"/>
+                <a:ea typeface="Tahoma" panose="020B0604030504040204" pitchFamily="34" charset="0"/>
+                <a:cs typeface="Tahoma" panose="020B0604030504040204" pitchFamily="34" charset="0"/>
+              </a:rPr>
+              <a:t>Deployments on multiple platforms including seL4 verified microkernel.</a:t>
+            </a:r>
+          </a:p>
+          <a:p>
+            <a:endParaRPr lang="en-US" dirty="0">
+              <a:latin typeface="Tahoma" panose="020B0604030504040204" pitchFamily="34" charset="0"/>
+              <a:ea typeface="Tahoma" panose="020B0604030504040204" pitchFamily="34" charset="0"/>
+              <a:cs typeface="Tahoma" panose="020B0604030504040204" pitchFamily="34" charset="0"/>
+            </a:endParaRPr>
+          </a:p>
+        </p:txBody>
+      </p:sp>
+      <p:sp>
+        <p:nvSpPr>
+          <p:cNvPr id="4" name="Slide Number Placeholder 3">
+            <a:extLst>
+              <a:ext uri="{FF2B5EF4-FFF2-40B4-BE49-F238E27FC236}">
+                <a16:creationId xmlns:a16="http://schemas.microsoft.com/office/drawing/2014/main" id="{386DFE06-D674-22D3-8782-1C47F5BE204F}"/>
+              </a:ext>
+            </a:extLst>
+          </p:cNvPr>
+          <p:cNvSpPr>
+            <a:spLocks noGrp="1"/>
+          </p:cNvSpPr>
+          <p:nvPr>
+            <p:ph type="sldNum" sz="quarter" idx="5"/>
+          </p:nvPr>
+        </p:nvSpPr>
+        <p:spPr/>
+        <p:txBody>
+          <a:bodyPr/>
+          <a:lstStyle/>
+          <a:p>
+            <a:pPr>
+              <a:defRPr/>
+            </a:pPr>
+            <a:fld id="{2BFE2475-28EF-9A44-97D3-D2287C00B1B1}" type="slidenum">
+              <a:rPr lang="en-US" smtClean="0"/>
+              <a:pPr>
+                <a:defRPr/>
+              </a:pPr>
+              <a:t>7</a:t>
+            </a:fld>
+            <a:endParaRPr lang="en-US"/>
+          </a:p>
+        </p:txBody>
+      </p:sp>
+    </p:spTree>
+    <p:extLst>
+      <p:ext uri="{BB962C8B-B14F-4D97-AF65-F5344CB8AC3E}">
+        <p14:creationId xmlns:p14="http://schemas.microsoft.com/office/powerpoint/2010/main" val="4092460006"/>
       </p:ext>
     </p:extLst>
   </p:cSld>
@@ -4857,13 +5757,8 @@
           <a:p>
             <a:r>
               <a:rPr lang="en-US" sz="3600" dirty="0"/>
-              <a:t>Proof in </a:t>
-            </a:r>
-            <a:r>
-              <a:rPr lang="en-US" sz="3600" dirty="0" err="1"/>
-              <a:t>Logika</a:t>
-            </a:r>
-            <a:endParaRPr lang="en-US" sz="3600" dirty="0"/>
+              <a:t>Expression Rewriting</a:t>
+            </a:r>
           </a:p>
         </p:txBody>
       </p:sp>
@@ -4949,7 +5844,311 @@
           <a:p>
             <a:r>
               <a:rPr lang="en-US" sz="1600" dirty="0"/>
-              <a:t>Natural Deduction Proofs</a:t>
+              <a:t>Systematic application of equalities </a:t>
+            </a:r>
+          </a:p>
+        </p:txBody>
+      </p:sp>
+      <p:sp>
+        <p:nvSpPr>
+          <p:cNvPr id="4" name="TextBox 3">
+            <a:extLst>
+              <a:ext uri="{FF2B5EF4-FFF2-40B4-BE49-F238E27FC236}">
+                <a16:creationId xmlns:a16="http://schemas.microsoft.com/office/drawing/2014/main" id="{B96E00F2-C7D7-BBD9-E80B-05BDA11A7C1B}"/>
+              </a:ext>
+            </a:extLst>
+          </p:cNvPr>
+          <p:cNvSpPr txBox="1"/>
+          <p:nvPr/>
+        </p:nvSpPr>
+        <p:spPr>
+          <a:xfrm>
+            <a:off x="533400" y="1600200"/>
+            <a:ext cx="7391400" cy="1200329"/>
+          </a:xfrm>
+          <a:prstGeom prst="rect">
+            <a:avLst/>
+          </a:prstGeom>
+          <a:noFill/>
+        </p:spPr>
+        <p:txBody>
+          <a:bodyPr wrap="square" rtlCol="0">
+            <a:spAutoFit/>
+          </a:bodyPr>
+          <a:lstStyle/>
+          <a:p>
+            <a:r>
+              <a:rPr lang="en-GB" sz="1800" dirty="0"/>
+              <a:t>Many facts have the shape of equalities, e.g.,</a:t>
+            </a:r>
+          </a:p>
+          <a:p>
+            <a:pPr marL="285750" indent="-285750">
+              <a:buFont typeface="Arial" panose="020B0604020202020204" pitchFamily="34" charset="0"/>
+              <a:buChar char="•"/>
+            </a:pPr>
+            <a:r>
+              <a:rPr lang="en-GB" sz="1800" dirty="0"/>
+              <a:t>Properties of numbers like </a:t>
+            </a:r>
+            <a:r>
+              <a:rPr lang="en-GB" sz="1800" dirty="0">
+                <a:solidFill>
+                  <a:srgbClr val="8922FD"/>
+                </a:solidFill>
+                <a:latin typeface="Menlo" panose="020B0609030804020204" pitchFamily="49" charset="0"/>
+                <a:ea typeface="Menlo" panose="020B0609030804020204" pitchFamily="49" charset="0"/>
+                <a:cs typeface="Menlo" panose="020B0609030804020204" pitchFamily="49" charset="0"/>
+              </a:rPr>
+              <a:t>x + 0 = x</a:t>
+            </a:r>
+          </a:p>
+          <a:p>
+            <a:pPr marL="285750" indent="-285750">
+              <a:buFont typeface="Arial" panose="020B0604020202020204" pitchFamily="34" charset="0"/>
+              <a:buChar char="•"/>
+            </a:pPr>
+            <a:r>
+              <a:rPr lang="en-GB" sz="1800" dirty="0"/>
+              <a:t>Function definitions like </a:t>
+            </a:r>
+            <a:r>
+              <a:rPr lang="en-GB" sz="1800" dirty="0">
+                <a:solidFill>
+                  <a:srgbClr val="8922FD"/>
+                </a:solidFill>
+                <a:latin typeface="Menlo" panose="020B0609030804020204" pitchFamily="49" charset="0"/>
+                <a:ea typeface="Menlo" panose="020B0609030804020204" pitchFamily="49" charset="0"/>
+                <a:cs typeface="Menlo" panose="020B0609030804020204" pitchFamily="49" charset="0"/>
+              </a:rPr>
+              <a:t>f(x) = if (x &gt; 0) then x else 0</a:t>
+            </a:r>
+          </a:p>
+          <a:p>
+            <a:pPr marL="285750" indent="-285750">
+              <a:buFont typeface="Arial" panose="020B0604020202020204" pitchFamily="34" charset="0"/>
+              <a:buChar char="•"/>
+            </a:pPr>
+            <a:r>
+              <a:rPr lang="en-GB" sz="1800" dirty="0"/>
+              <a:t>Properties derived from the above </a:t>
+            </a:r>
+          </a:p>
+        </p:txBody>
+      </p:sp>
+      <p:sp>
+        <p:nvSpPr>
+          <p:cNvPr id="5" name="TextBox 4">
+            <a:extLst>
+              <a:ext uri="{FF2B5EF4-FFF2-40B4-BE49-F238E27FC236}">
+                <a16:creationId xmlns:a16="http://schemas.microsoft.com/office/drawing/2014/main" id="{DA3B429C-54FB-7979-489D-EED4D59EC5A2}"/>
+              </a:ext>
+            </a:extLst>
+          </p:cNvPr>
+          <p:cNvSpPr txBox="1"/>
+          <p:nvPr/>
+        </p:nvSpPr>
+        <p:spPr>
+          <a:xfrm>
+            <a:off x="533400" y="3033236"/>
+            <a:ext cx="8534400" cy="1477328"/>
+          </a:xfrm>
+          <a:prstGeom prst="rect">
+            <a:avLst/>
+          </a:prstGeom>
+          <a:noFill/>
+        </p:spPr>
+        <p:txBody>
+          <a:bodyPr wrap="square" rtlCol="0">
+            <a:spAutoFit/>
+          </a:bodyPr>
+          <a:lstStyle/>
+          <a:p>
+            <a:r>
+              <a:rPr lang="en-GB" sz="1800" dirty="0"/>
+              <a:t>These can be exploited in proofs, e.g.,</a:t>
+            </a:r>
+          </a:p>
+          <a:p>
+            <a:pPr>
+              <a:tabLst>
+                <a:tab pos="3460750" algn="l"/>
+              </a:tabLst>
+            </a:pPr>
+            <a:r>
+              <a:rPr lang="en-GB" sz="1800" dirty="0">
+                <a:solidFill>
+                  <a:srgbClr val="8922FD"/>
+                </a:solidFill>
+                <a:latin typeface="Menlo" panose="020B0609030804020204" pitchFamily="49" charset="0"/>
+                <a:ea typeface="Menlo" panose="020B0609030804020204" pitchFamily="49" charset="0"/>
+                <a:cs typeface="Menlo" panose="020B0609030804020204" pitchFamily="49" charset="0"/>
+              </a:rPr>
+              <a:t>f(1) + 0</a:t>
+            </a:r>
+          </a:p>
+          <a:p>
+            <a:pPr>
+              <a:tabLst>
+                <a:tab pos="3460750" algn="l"/>
+              </a:tabLst>
+            </a:pPr>
+            <a:r>
+              <a:rPr lang="en-GB" sz="1800" dirty="0">
+                <a:solidFill>
+                  <a:srgbClr val="8922FD"/>
+                </a:solidFill>
+                <a:latin typeface="Menlo" panose="020B0609030804020204" pitchFamily="49" charset="0"/>
+                <a:ea typeface="Menlo" panose="020B0609030804020204" pitchFamily="49" charset="0"/>
+                <a:cs typeface="Menlo" panose="020B0609030804020204" pitchFamily="49" charset="0"/>
+              </a:rPr>
+              <a:t>f(1)</a:t>
+            </a:r>
+            <a:r>
+              <a:rPr lang="en-GB" sz="1800" dirty="0"/>
+              <a:t>	using </a:t>
+            </a:r>
+            <a:r>
+              <a:rPr lang="en-GB" sz="1800" dirty="0">
+                <a:solidFill>
+                  <a:srgbClr val="8922FD"/>
+                </a:solidFill>
+                <a:latin typeface="Menlo" panose="020B0609030804020204" pitchFamily="49" charset="0"/>
+                <a:ea typeface="Menlo" panose="020B0609030804020204" pitchFamily="49" charset="0"/>
+                <a:cs typeface="Menlo" panose="020B0609030804020204" pitchFamily="49" charset="0"/>
+              </a:rPr>
+              <a:t>x + 0 = x</a:t>
+            </a:r>
+            <a:endParaRPr lang="en-GB" sz="1800" dirty="0"/>
+          </a:p>
+          <a:p>
+            <a:pPr>
+              <a:tabLst>
+                <a:tab pos="3460750" algn="l"/>
+              </a:tabLst>
+            </a:pPr>
+            <a:r>
+              <a:rPr lang="en-GB" sz="1800" dirty="0">
+                <a:solidFill>
+                  <a:srgbClr val="8922FD"/>
+                </a:solidFill>
+                <a:latin typeface="Menlo" panose="020B0609030804020204" pitchFamily="49" charset="0"/>
+                <a:ea typeface="Menlo" panose="020B0609030804020204" pitchFamily="49" charset="0"/>
+                <a:cs typeface="Menlo" panose="020B0609030804020204" pitchFamily="49" charset="0"/>
+              </a:rPr>
+              <a:t>if (1 &gt; 0) then 1 else 0</a:t>
+            </a:r>
+            <a:r>
+              <a:rPr lang="en-GB" sz="1800" dirty="0"/>
+              <a:t>	using </a:t>
+            </a:r>
+            <a:r>
+              <a:rPr lang="en-GB" sz="1800" dirty="0">
+                <a:solidFill>
+                  <a:srgbClr val="8922FD"/>
+                </a:solidFill>
+                <a:latin typeface="Menlo" panose="020B0609030804020204" pitchFamily="49" charset="0"/>
+                <a:ea typeface="Menlo" panose="020B0609030804020204" pitchFamily="49" charset="0"/>
+                <a:cs typeface="Menlo" panose="020B0609030804020204" pitchFamily="49" charset="0"/>
+              </a:rPr>
+              <a:t>f(x) = if (x &gt; 0) then x else 0</a:t>
+            </a:r>
+            <a:endParaRPr lang="en-GB" sz="1800" dirty="0"/>
+          </a:p>
+          <a:p>
+            <a:pPr>
+              <a:tabLst>
+                <a:tab pos="3460750" algn="l"/>
+              </a:tabLst>
+            </a:pPr>
+            <a:r>
+              <a:rPr lang="en-GB" sz="1800" dirty="0">
+                <a:solidFill>
+                  <a:srgbClr val="8922FD"/>
+                </a:solidFill>
+                <a:latin typeface="Menlo" panose="020B0609030804020204" pitchFamily="49" charset="0"/>
+                <a:ea typeface="Menlo" panose="020B0609030804020204" pitchFamily="49" charset="0"/>
+                <a:cs typeface="Menlo" panose="020B0609030804020204" pitchFamily="49" charset="0"/>
+              </a:rPr>
+              <a:t>1</a:t>
+            </a:r>
+            <a:r>
+              <a:rPr lang="en-GB" sz="1800" dirty="0"/>
+              <a:t>	using semantics of if-statement</a:t>
+            </a:r>
+          </a:p>
+        </p:txBody>
+      </p:sp>
+      <p:sp>
+        <p:nvSpPr>
+          <p:cNvPr id="6" name="TextBox 5">
+            <a:extLst>
+              <a:ext uri="{FF2B5EF4-FFF2-40B4-BE49-F238E27FC236}">
+                <a16:creationId xmlns:a16="http://schemas.microsoft.com/office/drawing/2014/main" id="{0171ED84-E81C-3E8F-E4E8-5E44A471AD9F}"/>
+              </a:ext>
+            </a:extLst>
+          </p:cNvPr>
+          <p:cNvSpPr txBox="1"/>
+          <p:nvPr/>
+        </p:nvSpPr>
+        <p:spPr>
+          <a:xfrm>
+            <a:off x="502578" y="4738934"/>
+            <a:ext cx="8336622" cy="369332"/>
+          </a:xfrm>
+          <a:prstGeom prst="rect">
+            <a:avLst/>
+          </a:prstGeom>
+          <a:noFill/>
+        </p:spPr>
+        <p:txBody>
+          <a:bodyPr wrap="square" rtlCol="0">
+            <a:spAutoFit/>
+          </a:bodyPr>
+          <a:lstStyle/>
+          <a:p>
+            <a:r>
+              <a:rPr lang="en-GB" sz="1800" dirty="0" err="1"/>
+              <a:t>Logika</a:t>
+            </a:r>
+            <a:r>
+              <a:rPr lang="en-GB" sz="1800" dirty="0"/>
+              <a:t> has some rewriting rules based on semantics (and expression evaluation)</a:t>
+            </a:r>
+          </a:p>
+        </p:txBody>
+      </p:sp>
+      <p:sp>
+        <p:nvSpPr>
+          <p:cNvPr id="7" name="TextBox 6">
+            <a:extLst>
+              <a:ext uri="{FF2B5EF4-FFF2-40B4-BE49-F238E27FC236}">
+                <a16:creationId xmlns:a16="http://schemas.microsoft.com/office/drawing/2014/main" id="{499A4B44-97DB-7E9A-826C-AA873843DFB2}"/>
+              </a:ext>
+            </a:extLst>
+          </p:cNvPr>
+          <p:cNvSpPr txBox="1"/>
+          <p:nvPr/>
+        </p:nvSpPr>
+        <p:spPr>
+          <a:xfrm>
+            <a:off x="498297" y="5336636"/>
+            <a:ext cx="8336622" cy="369332"/>
+          </a:xfrm>
+          <a:prstGeom prst="rect">
+            <a:avLst/>
+          </a:prstGeom>
+          <a:noFill/>
+        </p:spPr>
+        <p:txBody>
+          <a:bodyPr wrap="square" rtlCol="0">
+            <a:spAutoFit/>
+          </a:bodyPr>
+          <a:lstStyle/>
+          <a:p>
+            <a:r>
+              <a:rPr lang="en-GB" sz="1800" dirty="0"/>
+              <a:t>Other rewriting rules can be added and used in proofs</a:t>
             </a:r>
           </a:p>
         </p:txBody>
@@ -4958,6 +6157,935 @@
     <p:extLst>
       <p:ext uri="{BB962C8B-B14F-4D97-AF65-F5344CB8AC3E}">
         <p14:creationId xmlns:p14="http://schemas.microsoft.com/office/powerpoint/2010/main" val="974532288"/>
+      </p:ext>
+    </p:extLst>
+  </p:cSld>
+  <p:clrMapOvr>
+    <a:masterClrMapping/>
+  </p:clrMapOvr>
+</p:sld>
+</file>
+
+<file path=ppt/slides/slide3.xml><?xml version="1.0" encoding="utf-8"?>
+<p:sld xmlns:a="http://schemas.openxmlformats.org/drawingml/2006/main" xmlns:r="http://schemas.openxmlformats.org/officeDocument/2006/relationships" xmlns:p="http://schemas.openxmlformats.org/presentationml/2006/main">
+  <p:cSld>
+    <p:spTree>
+      <p:nvGrpSpPr>
+        <p:cNvPr id="1" name="">
+          <a:extLst>
+            <a:ext uri="{FF2B5EF4-FFF2-40B4-BE49-F238E27FC236}">
+              <a16:creationId xmlns:a16="http://schemas.microsoft.com/office/drawing/2014/main" id="{AB8F1111-F537-5AB4-1279-70D03A2B4E45}"/>
+            </a:ext>
+          </a:extLst>
+        </p:cNvPr>
+        <p:cNvGrpSpPr/>
+        <p:nvPr/>
+      </p:nvGrpSpPr>
+      <p:grpSpPr>
+        <a:xfrm>
+          <a:off x="0" y="0"/>
+          <a:ext cx="0" cy="0"/>
+          <a:chOff x="0" y="0"/>
+          <a:chExt cx="0" cy="0"/>
+        </a:xfrm>
+      </p:grpSpPr>
+      <p:sp>
+        <p:nvSpPr>
+          <p:cNvPr id="2" name="Title 1">
+            <a:extLst>
+              <a:ext uri="{FF2B5EF4-FFF2-40B4-BE49-F238E27FC236}">
+                <a16:creationId xmlns:a16="http://schemas.microsoft.com/office/drawing/2014/main" id="{12F5BBFE-38BD-C912-ACC2-A72C1B9CB452}"/>
+              </a:ext>
+            </a:extLst>
+          </p:cNvPr>
+          <p:cNvSpPr>
+            <a:spLocks noGrp="1"/>
+          </p:cNvSpPr>
+          <p:nvPr>
+            <p:ph type="title"/>
+          </p:nvPr>
+        </p:nvSpPr>
+        <p:spPr/>
+        <p:txBody>
+          <a:bodyPr/>
+          <a:lstStyle/>
+          <a:p>
+            <a:r>
+              <a:rPr lang="en-US" sz="3600" dirty="0"/>
+              <a:t>Expression Rewriting</a:t>
+            </a:r>
+          </a:p>
+        </p:txBody>
+      </p:sp>
+      <p:sp>
+        <p:nvSpPr>
+          <p:cNvPr id="128" name="Slide Number Placeholder 127">
+            <a:extLst>
+              <a:ext uri="{FF2B5EF4-FFF2-40B4-BE49-F238E27FC236}">
+                <a16:creationId xmlns:a16="http://schemas.microsoft.com/office/drawing/2014/main" id="{414942EE-24C9-7EAA-AD56-93ED67F4A8D4}"/>
+              </a:ext>
+            </a:extLst>
+          </p:cNvPr>
+          <p:cNvSpPr>
+            <a:spLocks noGrp="1"/>
+          </p:cNvSpPr>
+          <p:nvPr>
+            <p:ph type="sldNum" sz="quarter" idx="11"/>
+          </p:nvPr>
+        </p:nvSpPr>
+        <p:spPr/>
+        <p:txBody>
+          <a:bodyPr/>
+          <a:lstStyle/>
+          <a:p>
+            <a:pPr>
+              <a:defRPr/>
+            </a:pPr>
+            <a:fld id="{6E0AA622-F4CE-604D-A669-CD3D12FC535C}" type="slidenum">
+              <a:rPr lang="en-US" smtClean="0"/>
+              <a:pPr>
+                <a:defRPr/>
+              </a:pPr>
+              <a:t>3</a:t>
+            </a:fld>
+            <a:endParaRPr lang="en-US" dirty="0"/>
+          </a:p>
+        </p:txBody>
+      </p:sp>
+      <p:sp>
+        <p:nvSpPr>
+          <p:cNvPr id="3" name="TextBox 2">
+            <a:extLst>
+              <a:ext uri="{FF2B5EF4-FFF2-40B4-BE49-F238E27FC236}">
+                <a16:creationId xmlns:a16="http://schemas.microsoft.com/office/drawing/2014/main" id="{9DE81A38-51BC-4160-AD75-94FC8237B39B}"/>
+              </a:ext>
+            </a:extLst>
+          </p:cNvPr>
+          <p:cNvSpPr txBox="1"/>
+          <p:nvPr/>
+        </p:nvSpPr>
+        <p:spPr>
+          <a:xfrm>
+            <a:off x="381000" y="1158925"/>
+            <a:ext cx="8016766" cy="338554"/>
+          </a:xfrm>
+          <a:prstGeom prst="rect">
+            <a:avLst/>
+          </a:prstGeom>
+          <a:gradFill flip="none" rotWithShape="1">
+            <a:gsLst>
+              <a:gs pos="0">
+                <a:schemeClr val="bg1"/>
+              </a:gs>
+              <a:gs pos="74000">
+                <a:srgbClr val="FFE267"/>
+              </a:gs>
+              <a:gs pos="83000">
+                <a:srgbClr val="FFE267"/>
+              </a:gs>
+              <a:gs pos="100000">
+                <a:srgbClr val="FFE267"/>
+              </a:gs>
+            </a:gsLst>
+            <a:lin ang="10800000" scaled="1"/>
+            <a:tileRect/>
+          </a:gradFill>
+        </p:spPr>
+        <p:txBody>
+          <a:bodyPr wrap="square" rtlCol="0">
+            <a:spAutoFit/>
+          </a:bodyPr>
+          <a:lstStyle/>
+          <a:p>
+            <a:r>
+              <a:rPr lang="en-US" sz="1600" dirty="0"/>
+              <a:t>Abstract function definitions</a:t>
+            </a:r>
+          </a:p>
+        </p:txBody>
+      </p:sp>
+      <p:pic>
+        <p:nvPicPr>
+          <p:cNvPr id="5" name="Picture 4" descr="A screenshot of a computer code&#10;&#10;Description automatically generated">
+            <a:extLst>
+              <a:ext uri="{FF2B5EF4-FFF2-40B4-BE49-F238E27FC236}">
+                <a16:creationId xmlns:a16="http://schemas.microsoft.com/office/drawing/2014/main" id="{35363194-AEEA-8056-ADF3-05EDC8F7DD5F}"/>
+              </a:ext>
+            </a:extLst>
+          </p:cNvPr>
+          <p:cNvPicPr>
+            <a:picLocks noChangeAspect="1"/>
+          </p:cNvPicPr>
+          <p:nvPr/>
+        </p:nvPicPr>
+        <p:blipFill>
+          <a:blip r:embed="rId3"/>
+          <a:stretch>
+            <a:fillRect/>
+          </a:stretch>
+        </p:blipFill>
+        <p:spPr>
+          <a:xfrm>
+            <a:off x="533400" y="1676400"/>
+            <a:ext cx="5676900" cy="2286000"/>
+          </a:xfrm>
+          <a:prstGeom prst="rect">
+            <a:avLst/>
+          </a:prstGeom>
+        </p:spPr>
+      </p:pic>
+    </p:spTree>
+    <p:extLst>
+      <p:ext uri="{BB962C8B-B14F-4D97-AF65-F5344CB8AC3E}">
+        <p14:creationId xmlns:p14="http://schemas.microsoft.com/office/powerpoint/2010/main" val="2889095101"/>
+      </p:ext>
+    </p:extLst>
+  </p:cSld>
+  <p:clrMapOvr>
+    <a:masterClrMapping/>
+  </p:clrMapOvr>
+</p:sld>
+</file>
+
+<file path=ppt/slides/slide4.xml><?xml version="1.0" encoding="utf-8"?>
+<p:sld xmlns:a="http://schemas.openxmlformats.org/drawingml/2006/main" xmlns:r="http://schemas.openxmlformats.org/officeDocument/2006/relationships" xmlns:p="http://schemas.openxmlformats.org/presentationml/2006/main">
+  <p:cSld>
+    <p:spTree>
+      <p:nvGrpSpPr>
+        <p:cNvPr id="1" name="">
+          <a:extLst>
+            <a:ext uri="{FF2B5EF4-FFF2-40B4-BE49-F238E27FC236}">
+              <a16:creationId xmlns:a16="http://schemas.microsoft.com/office/drawing/2014/main" id="{05474CEF-F076-5C09-BFC8-783B56DBD6A5}"/>
+            </a:ext>
+          </a:extLst>
+        </p:cNvPr>
+        <p:cNvGrpSpPr/>
+        <p:nvPr/>
+      </p:nvGrpSpPr>
+      <p:grpSpPr>
+        <a:xfrm>
+          <a:off x="0" y="0"/>
+          <a:ext cx="0" cy="0"/>
+          <a:chOff x="0" y="0"/>
+          <a:chExt cx="0" cy="0"/>
+        </a:xfrm>
+      </p:grpSpPr>
+      <p:pic>
+        <p:nvPicPr>
+          <p:cNvPr id="6" name="Picture 5" descr="A screenshot of a math program&#10;&#10;Description automatically generated">
+            <a:extLst>
+              <a:ext uri="{FF2B5EF4-FFF2-40B4-BE49-F238E27FC236}">
+                <a16:creationId xmlns:a16="http://schemas.microsoft.com/office/drawing/2014/main" id="{8FA6E380-C2D6-EBEC-A5CE-AF7A5C09D83A}"/>
+              </a:ext>
+            </a:extLst>
+          </p:cNvPr>
+          <p:cNvPicPr>
+            <a:picLocks noChangeAspect="1"/>
+          </p:cNvPicPr>
+          <p:nvPr/>
+        </p:nvPicPr>
+        <p:blipFill>
+          <a:blip r:embed="rId3"/>
+          <a:stretch>
+            <a:fillRect/>
+          </a:stretch>
+        </p:blipFill>
+        <p:spPr>
+          <a:xfrm>
+            <a:off x="533400" y="1676400"/>
+            <a:ext cx="7772400" cy="3136636"/>
+          </a:xfrm>
+          <a:prstGeom prst="rect">
+            <a:avLst/>
+          </a:prstGeom>
+        </p:spPr>
+      </p:pic>
+      <p:sp>
+        <p:nvSpPr>
+          <p:cNvPr id="2" name="Title 1">
+            <a:extLst>
+              <a:ext uri="{FF2B5EF4-FFF2-40B4-BE49-F238E27FC236}">
+                <a16:creationId xmlns:a16="http://schemas.microsoft.com/office/drawing/2014/main" id="{913BC31D-B073-7C27-4CB1-C91FA990CF0B}"/>
+              </a:ext>
+            </a:extLst>
+          </p:cNvPr>
+          <p:cNvSpPr>
+            <a:spLocks noGrp="1"/>
+          </p:cNvSpPr>
+          <p:nvPr>
+            <p:ph type="title"/>
+          </p:nvPr>
+        </p:nvSpPr>
+        <p:spPr/>
+        <p:txBody>
+          <a:bodyPr/>
+          <a:lstStyle/>
+          <a:p>
+            <a:r>
+              <a:rPr lang="en-US" sz="3600" dirty="0"/>
+              <a:t>Expression Rewriting</a:t>
+            </a:r>
+          </a:p>
+        </p:txBody>
+      </p:sp>
+      <p:sp>
+        <p:nvSpPr>
+          <p:cNvPr id="128" name="Slide Number Placeholder 127">
+            <a:extLst>
+              <a:ext uri="{FF2B5EF4-FFF2-40B4-BE49-F238E27FC236}">
+                <a16:creationId xmlns:a16="http://schemas.microsoft.com/office/drawing/2014/main" id="{C893FA73-329B-41E0-2A65-C40232C3859B}"/>
+              </a:ext>
+            </a:extLst>
+          </p:cNvPr>
+          <p:cNvSpPr>
+            <a:spLocks noGrp="1"/>
+          </p:cNvSpPr>
+          <p:nvPr>
+            <p:ph type="sldNum" sz="quarter" idx="11"/>
+          </p:nvPr>
+        </p:nvSpPr>
+        <p:spPr/>
+        <p:txBody>
+          <a:bodyPr/>
+          <a:lstStyle/>
+          <a:p>
+            <a:pPr>
+              <a:defRPr/>
+            </a:pPr>
+            <a:fld id="{6E0AA622-F4CE-604D-A669-CD3D12FC535C}" type="slidenum">
+              <a:rPr lang="en-US" smtClean="0"/>
+              <a:pPr>
+                <a:defRPr/>
+              </a:pPr>
+              <a:t>4</a:t>
+            </a:fld>
+            <a:endParaRPr lang="en-US" dirty="0"/>
+          </a:p>
+        </p:txBody>
+      </p:sp>
+      <p:sp>
+        <p:nvSpPr>
+          <p:cNvPr id="3" name="TextBox 2">
+            <a:extLst>
+              <a:ext uri="{FF2B5EF4-FFF2-40B4-BE49-F238E27FC236}">
+                <a16:creationId xmlns:a16="http://schemas.microsoft.com/office/drawing/2014/main" id="{6D8650BC-1BEB-5211-AFD8-0D22E7CFC32E}"/>
+              </a:ext>
+            </a:extLst>
+          </p:cNvPr>
+          <p:cNvSpPr txBox="1"/>
+          <p:nvPr/>
+        </p:nvSpPr>
+        <p:spPr>
+          <a:xfrm>
+            <a:off x="381000" y="1158925"/>
+            <a:ext cx="8016766" cy="338554"/>
+          </a:xfrm>
+          <a:prstGeom prst="rect">
+            <a:avLst/>
+          </a:prstGeom>
+          <a:gradFill flip="none" rotWithShape="1">
+            <a:gsLst>
+              <a:gs pos="0">
+                <a:schemeClr val="bg1"/>
+              </a:gs>
+              <a:gs pos="74000">
+                <a:srgbClr val="FFE267"/>
+              </a:gs>
+              <a:gs pos="83000">
+                <a:srgbClr val="FFE267"/>
+              </a:gs>
+              <a:gs pos="100000">
+                <a:srgbClr val="FFE267"/>
+              </a:gs>
+            </a:gsLst>
+            <a:lin ang="10800000" scaled="1"/>
+            <a:tileRect/>
+          </a:gradFill>
+        </p:spPr>
+        <p:txBody>
+          <a:bodyPr wrap="square" rtlCol="0">
+            <a:spAutoFit/>
+          </a:bodyPr>
+          <a:lstStyle/>
+          <a:p>
+            <a:r>
+              <a:rPr lang="en-US" sz="1600" dirty="0"/>
+              <a:t>The </a:t>
+            </a:r>
+            <a:r>
+              <a:rPr lang="en-US" sz="1600" dirty="0">
+                <a:latin typeface="Menlo" panose="020B0609030804020204" pitchFamily="49" charset="0"/>
+                <a:ea typeface="Menlo" panose="020B0609030804020204" pitchFamily="49" charset="0"/>
+                <a:cs typeface="Menlo" panose="020B0609030804020204" pitchFamily="49" charset="0"/>
+              </a:rPr>
+              <a:t>Rewrite</a:t>
+            </a:r>
+            <a:r>
+              <a:rPr lang="en-US" sz="1600" dirty="0"/>
+              <a:t> tactic</a:t>
+            </a:r>
+          </a:p>
+        </p:txBody>
+      </p:sp>
+    </p:spTree>
+    <p:extLst>
+      <p:ext uri="{BB962C8B-B14F-4D97-AF65-F5344CB8AC3E}">
+        <p14:creationId xmlns:p14="http://schemas.microsoft.com/office/powerpoint/2010/main" val="945844136"/>
+      </p:ext>
+    </p:extLst>
+  </p:cSld>
+  <p:clrMapOvr>
+    <a:masterClrMapping/>
+  </p:clrMapOvr>
+</p:sld>
+</file>
+
+<file path=ppt/slides/slide5.xml><?xml version="1.0" encoding="utf-8"?>
+<p:sld xmlns:a="http://schemas.openxmlformats.org/drawingml/2006/main" xmlns:r="http://schemas.openxmlformats.org/officeDocument/2006/relationships" xmlns:p="http://schemas.openxmlformats.org/presentationml/2006/main">
+  <p:cSld>
+    <p:spTree>
+      <p:nvGrpSpPr>
+        <p:cNvPr id="1" name="">
+          <a:extLst>
+            <a:ext uri="{FF2B5EF4-FFF2-40B4-BE49-F238E27FC236}">
+              <a16:creationId xmlns:a16="http://schemas.microsoft.com/office/drawing/2014/main" id="{162F2D4F-8C02-FC14-33A7-8B9BCB0992A0}"/>
+            </a:ext>
+          </a:extLst>
+        </p:cNvPr>
+        <p:cNvGrpSpPr/>
+        <p:nvPr/>
+      </p:nvGrpSpPr>
+      <p:grpSpPr>
+        <a:xfrm>
+          <a:off x="0" y="0"/>
+          <a:ext cx="0" cy="0"/>
+          <a:chOff x="0" y="0"/>
+          <a:chExt cx="0" cy="0"/>
+        </a:xfrm>
+      </p:grpSpPr>
+      <p:pic>
+        <p:nvPicPr>
+          <p:cNvPr id="6" name="Picture 5" descr="A screenshot of a math problem&#10;&#10;Description automatically generated">
+            <a:extLst>
+              <a:ext uri="{FF2B5EF4-FFF2-40B4-BE49-F238E27FC236}">
+                <a16:creationId xmlns:a16="http://schemas.microsoft.com/office/drawing/2014/main" id="{65110875-4C1D-C2F4-9623-861F284BEB87}"/>
+              </a:ext>
+            </a:extLst>
+          </p:cNvPr>
+          <p:cNvPicPr>
+            <a:picLocks noChangeAspect="1"/>
+          </p:cNvPicPr>
+          <p:nvPr/>
+        </p:nvPicPr>
+        <p:blipFill>
+          <a:blip r:embed="rId3"/>
+          <a:stretch>
+            <a:fillRect/>
+          </a:stretch>
+        </p:blipFill>
+        <p:spPr>
+          <a:xfrm>
+            <a:off x="533400" y="1676400"/>
+            <a:ext cx="7772400" cy="4147771"/>
+          </a:xfrm>
+          <a:prstGeom prst="rect">
+            <a:avLst/>
+          </a:prstGeom>
+        </p:spPr>
+      </p:pic>
+      <p:sp>
+        <p:nvSpPr>
+          <p:cNvPr id="2" name="Title 1">
+            <a:extLst>
+              <a:ext uri="{FF2B5EF4-FFF2-40B4-BE49-F238E27FC236}">
+                <a16:creationId xmlns:a16="http://schemas.microsoft.com/office/drawing/2014/main" id="{8117C642-5155-D283-BCA1-4DAD54B70BE7}"/>
+              </a:ext>
+            </a:extLst>
+          </p:cNvPr>
+          <p:cNvSpPr>
+            <a:spLocks noGrp="1"/>
+          </p:cNvSpPr>
+          <p:nvPr>
+            <p:ph type="title"/>
+          </p:nvPr>
+        </p:nvSpPr>
+        <p:spPr/>
+        <p:txBody>
+          <a:bodyPr/>
+          <a:lstStyle/>
+          <a:p>
+            <a:r>
+              <a:rPr lang="en-US" sz="3600" dirty="0"/>
+              <a:t>Expression Rewriting</a:t>
+            </a:r>
+          </a:p>
+        </p:txBody>
+      </p:sp>
+      <p:sp>
+        <p:nvSpPr>
+          <p:cNvPr id="128" name="Slide Number Placeholder 127">
+            <a:extLst>
+              <a:ext uri="{FF2B5EF4-FFF2-40B4-BE49-F238E27FC236}">
+                <a16:creationId xmlns:a16="http://schemas.microsoft.com/office/drawing/2014/main" id="{0C42E801-DA9D-77D4-F61D-9A099E428B6D}"/>
+              </a:ext>
+            </a:extLst>
+          </p:cNvPr>
+          <p:cNvSpPr>
+            <a:spLocks noGrp="1"/>
+          </p:cNvSpPr>
+          <p:nvPr>
+            <p:ph type="sldNum" sz="quarter" idx="11"/>
+          </p:nvPr>
+        </p:nvSpPr>
+        <p:spPr/>
+        <p:txBody>
+          <a:bodyPr/>
+          <a:lstStyle/>
+          <a:p>
+            <a:pPr>
+              <a:defRPr/>
+            </a:pPr>
+            <a:fld id="{6E0AA622-F4CE-604D-A669-CD3D12FC535C}" type="slidenum">
+              <a:rPr lang="en-US" smtClean="0"/>
+              <a:pPr>
+                <a:defRPr/>
+              </a:pPr>
+              <a:t>5</a:t>
+            </a:fld>
+            <a:endParaRPr lang="en-US" dirty="0"/>
+          </a:p>
+        </p:txBody>
+      </p:sp>
+      <p:sp>
+        <p:nvSpPr>
+          <p:cNvPr id="3" name="TextBox 2">
+            <a:extLst>
+              <a:ext uri="{FF2B5EF4-FFF2-40B4-BE49-F238E27FC236}">
+                <a16:creationId xmlns:a16="http://schemas.microsoft.com/office/drawing/2014/main" id="{7D73BFB1-A1C0-7B29-44C9-5665EB574443}"/>
+              </a:ext>
+            </a:extLst>
+          </p:cNvPr>
+          <p:cNvSpPr txBox="1"/>
+          <p:nvPr/>
+        </p:nvSpPr>
+        <p:spPr>
+          <a:xfrm>
+            <a:off x="381000" y="1158925"/>
+            <a:ext cx="8016766" cy="338554"/>
+          </a:xfrm>
+          <a:prstGeom prst="rect">
+            <a:avLst/>
+          </a:prstGeom>
+          <a:gradFill flip="none" rotWithShape="1">
+            <a:gsLst>
+              <a:gs pos="0">
+                <a:schemeClr val="bg1"/>
+              </a:gs>
+              <a:gs pos="74000">
+                <a:srgbClr val="FFE267"/>
+              </a:gs>
+              <a:gs pos="83000">
+                <a:srgbClr val="FFE267"/>
+              </a:gs>
+              <a:gs pos="100000">
+                <a:srgbClr val="FFE267"/>
+              </a:gs>
+            </a:gsLst>
+            <a:lin ang="10800000" scaled="1"/>
+            <a:tileRect/>
+          </a:gradFill>
+        </p:spPr>
+        <p:txBody>
+          <a:bodyPr wrap="square" rtlCol="0">
+            <a:spAutoFit/>
+          </a:bodyPr>
+          <a:lstStyle/>
+          <a:p>
+            <a:r>
+              <a:rPr lang="en-US" sz="1600" dirty="0"/>
+              <a:t>The </a:t>
+            </a:r>
+            <a:r>
+              <a:rPr lang="en-US" sz="1600" dirty="0" err="1">
+                <a:latin typeface="Menlo" panose="020B0609030804020204" pitchFamily="49" charset="0"/>
+                <a:ea typeface="Menlo" panose="020B0609030804020204" pitchFamily="49" charset="0"/>
+                <a:cs typeface="Menlo" panose="020B0609030804020204" pitchFamily="49" charset="0"/>
+              </a:rPr>
+              <a:t>RSimpl</a:t>
+            </a:r>
+            <a:r>
+              <a:rPr lang="en-US" sz="1600" dirty="0"/>
+              <a:t> tactic</a:t>
+            </a:r>
+          </a:p>
+        </p:txBody>
+      </p:sp>
+    </p:spTree>
+    <p:extLst>
+      <p:ext uri="{BB962C8B-B14F-4D97-AF65-F5344CB8AC3E}">
+        <p14:creationId xmlns:p14="http://schemas.microsoft.com/office/powerpoint/2010/main" val="3415203761"/>
+      </p:ext>
+    </p:extLst>
+  </p:cSld>
+  <p:clrMapOvr>
+    <a:masterClrMapping/>
+  </p:clrMapOvr>
+</p:sld>
+</file>
+
+<file path=ppt/slides/slide6.xml><?xml version="1.0" encoding="utf-8"?>
+<p:sld xmlns:a="http://schemas.openxmlformats.org/drawingml/2006/main" xmlns:r="http://schemas.openxmlformats.org/officeDocument/2006/relationships" xmlns:p="http://schemas.openxmlformats.org/presentationml/2006/main">
+  <p:cSld>
+    <p:spTree>
+      <p:nvGrpSpPr>
+        <p:cNvPr id="1" name="">
+          <a:extLst>
+            <a:ext uri="{FF2B5EF4-FFF2-40B4-BE49-F238E27FC236}">
+              <a16:creationId xmlns:a16="http://schemas.microsoft.com/office/drawing/2014/main" id="{3F414FF3-DA84-C2FB-BAF3-68E75930C438}"/>
+            </a:ext>
+          </a:extLst>
+        </p:cNvPr>
+        <p:cNvGrpSpPr/>
+        <p:nvPr/>
+      </p:nvGrpSpPr>
+      <p:grpSpPr>
+        <a:xfrm>
+          <a:off x="0" y="0"/>
+          <a:ext cx="0" cy="0"/>
+          <a:chOff x="0" y="0"/>
+          <a:chExt cx="0" cy="0"/>
+        </a:xfrm>
+      </p:grpSpPr>
+      <p:sp>
+        <p:nvSpPr>
+          <p:cNvPr id="2" name="Title 1">
+            <a:extLst>
+              <a:ext uri="{FF2B5EF4-FFF2-40B4-BE49-F238E27FC236}">
+                <a16:creationId xmlns:a16="http://schemas.microsoft.com/office/drawing/2014/main" id="{D395A07A-F2C9-FA0A-D766-0FD466664789}"/>
+              </a:ext>
+            </a:extLst>
+          </p:cNvPr>
+          <p:cNvSpPr>
+            <a:spLocks noGrp="1"/>
+          </p:cNvSpPr>
+          <p:nvPr>
+            <p:ph type="title"/>
+          </p:nvPr>
+        </p:nvSpPr>
+        <p:spPr/>
+        <p:txBody>
+          <a:bodyPr/>
+          <a:lstStyle/>
+          <a:p>
+            <a:r>
+              <a:rPr lang="en-US" sz="3600" dirty="0"/>
+              <a:t>Expression Rewriting</a:t>
+            </a:r>
+          </a:p>
+        </p:txBody>
+      </p:sp>
+      <p:sp>
+        <p:nvSpPr>
+          <p:cNvPr id="128" name="Slide Number Placeholder 127">
+            <a:extLst>
+              <a:ext uri="{FF2B5EF4-FFF2-40B4-BE49-F238E27FC236}">
+                <a16:creationId xmlns:a16="http://schemas.microsoft.com/office/drawing/2014/main" id="{4CA45419-937D-15A3-EF89-8C893B5CE8DC}"/>
+              </a:ext>
+            </a:extLst>
+          </p:cNvPr>
+          <p:cNvSpPr>
+            <a:spLocks noGrp="1"/>
+          </p:cNvSpPr>
+          <p:nvPr>
+            <p:ph type="sldNum" sz="quarter" idx="11"/>
+          </p:nvPr>
+        </p:nvSpPr>
+        <p:spPr/>
+        <p:txBody>
+          <a:bodyPr/>
+          <a:lstStyle/>
+          <a:p>
+            <a:pPr>
+              <a:defRPr/>
+            </a:pPr>
+            <a:fld id="{6E0AA622-F4CE-604D-A669-CD3D12FC535C}" type="slidenum">
+              <a:rPr lang="en-US" smtClean="0"/>
+              <a:pPr>
+                <a:defRPr/>
+              </a:pPr>
+              <a:t>6</a:t>
+            </a:fld>
+            <a:endParaRPr lang="en-US" dirty="0"/>
+          </a:p>
+        </p:txBody>
+      </p:sp>
+      <p:sp>
+        <p:nvSpPr>
+          <p:cNvPr id="3" name="TextBox 2">
+            <a:extLst>
+              <a:ext uri="{FF2B5EF4-FFF2-40B4-BE49-F238E27FC236}">
+                <a16:creationId xmlns:a16="http://schemas.microsoft.com/office/drawing/2014/main" id="{CA2750F5-89FF-8115-0A49-8D510ED4C023}"/>
+              </a:ext>
+            </a:extLst>
+          </p:cNvPr>
+          <p:cNvSpPr txBox="1"/>
+          <p:nvPr/>
+        </p:nvSpPr>
+        <p:spPr>
+          <a:xfrm>
+            <a:off x="381000" y="1158925"/>
+            <a:ext cx="8016766" cy="338554"/>
+          </a:xfrm>
+          <a:prstGeom prst="rect">
+            <a:avLst/>
+          </a:prstGeom>
+          <a:gradFill flip="none" rotWithShape="1">
+            <a:gsLst>
+              <a:gs pos="0">
+                <a:schemeClr val="bg1"/>
+              </a:gs>
+              <a:gs pos="74000">
+                <a:srgbClr val="FFE267"/>
+              </a:gs>
+              <a:gs pos="83000">
+                <a:srgbClr val="FFE267"/>
+              </a:gs>
+              <a:gs pos="100000">
+                <a:srgbClr val="FFE267"/>
+              </a:gs>
+            </a:gsLst>
+            <a:lin ang="10800000" scaled="1"/>
+            <a:tileRect/>
+          </a:gradFill>
+        </p:spPr>
+        <p:txBody>
+          <a:bodyPr wrap="square" rtlCol="0">
+            <a:spAutoFit/>
+          </a:bodyPr>
+          <a:lstStyle/>
+          <a:p>
+            <a:r>
+              <a:rPr lang="en-US" sz="1600" dirty="0"/>
+              <a:t>Forward substitution</a:t>
+            </a:r>
+          </a:p>
+        </p:txBody>
+      </p:sp>
+      <p:pic>
+        <p:nvPicPr>
+          <p:cNvPr id="5" name="Picture 4" descr="A screenshot of a math problem&#10;&#10;Description automatically generated">
+            <a:extLst>
+              <a:ext uri="{FF2B5EF4-FFF2-40B4-BE49-F238E27FC236}">
+                <a16:creationId xmlns:a16="http://schemas.microsoft.com/office/drawing/2014/main" id="{A1DC975B-16E3-92ED-EC5E-0D2BA423FC7F}"/>
+              </a:ext>
+            </a:extLst>
+          </p:cNvPr>
+          <p:cNvPicPr>
+            <a:picLocks noChangeAspect="1"/>
+          </p:cNvPicPr>
+          <p:nvPr/>
+        </p:nvPicPr>
+        <p:blipFill>
+          <a:blip r:embed="rId3"/>
+          <a:stretch>
+            <a:fillRect/>
+          </a:stretch>
+        </p:blipFill>
+        <p:spPr>
+          <a:xfrm>
+            <a:off x="625366" y="1942210"/>
+            <a:ext cx="7772400" cy="3756865"/>
+          </a:xfrm>
+          <a:prstGeom prst="rect">
+            <a:avLst/>
+          </a:prstGeom>
+        </p:spPr>
+      </p:pic>
+    </p:spTree>
+    <p:extLst>
+      <p:ext uri="{BB962C8B-B14F-4D97-AF65-F5344CB8AC3E}">
+        <p14:creationId xmlns:p14="http://schemas.microsoft.com/office/powerpoint/2010/main" val="2344217997"/>
+      </p:ext>
+    </p:extLst>
+  </p:cSld>
+  <p:clrMapOvr>
+    <a:masterClrMapping/>
+  </p:clrMapOvr>
+</p:sld>
+</file>
+
+<file path=ppt/slides/slide7.xml><?xml version="1.0" encoding="utf-8"?>
+<p:sld xmlns:a="http://schemas.openxmlformats.org/drawingml/2006/main" xmlns:r="http://schemas.openxmlformats.org/officeDocument/2006/relationships" xmlns:p="http://schemas.openxmlformats.org/presentationml/2006/main">
+  <p:cSld>
+    <p:spTree>
+      <p:nvGrpSpPr>
+        <p:cNvPr id="1" name="">
+          <a:extLst>
+            <a:ext uri="{FF2B5EF4-FFF2-40B4-BE49-F238E27FC236}">
+              <a16:creationId xmlns:a16="http://schemas.microsoft.com/office/drawing/2014/main" id="{1259811E-EE53-3614-BBDB-DEA7BE690332}"/>
+            </a:ext>
+          </a:extLst>
+        </p:cNvPr>
+        <p:cNvGrpSpPr/>
+        <p:nvPr/>
+      </p:nvGrpSpPr>
+      <p:grpSpPr>
+        <a:xfrm>
+          <a:off x="0" y="0"/>
+          <a:ext cx="0" cy="0"/>
+          <a:chOff x="0" y="0"/>
+          <a:chExt cx="0" cy="0"/>
+        </a:xfrm>
+      </p:grpSpPr>
+      <p:sp>
+        <p:nvSpPr>
+          <p:cNvPr id="2" name="Title 1">
+            <a:extLst>
+              <a:ext uri="{FF2B5EF4-FFF2-40B4-BE49-F238E27FC236}">
+                <a16:creationId xmlns:a16="http://schemas.microsoft.com/office/drawing/2014/main" id="{BC34EAE1-9189-4EE6-EB77-17A4B0ADE3CA}"/>
+              </a:ext>
+            </a:extLst>
+          </p:cNvPr>
+          <p:cNvSpPr>
+            <a:spLocks noGrp="1"/>
+          </p:cNvSpPr>
+          <p:nvPr>
+            <p:ph type="title"/>
+          </p:nvPr>
+        </p:nvSpPr>
+        <p:spPr/>
+        <p:txBody>
+          <a:bodyPr/>
+          <a:lstStyle/>
+          <a:p>
+            <a:r>
+              <a:rPr lang="en-US" sz="3600" dirty="0"/>
+              <a:t>Expression Rewriting</a:t>
+            </a:r>
+          </a:p>
+        </p:txBody>
+      </p:sp>
+      <p:sp>
+        <p:nvSpPr>
+          <p:cNvPr id="128" name="Slide Number Placeholder 127">
+            <a:extLst>
+              <a:ext uri="{FF2B5EF4-FFF2-40B4-BE49-F238E27FC236}">
+                <a16:creationId xmlns:a16="http://schemas.microsoft.com/office/drawing/2014/main" id="{7DFD8CD0-A5B9-876A-7851-07B3D1966F4E}"/>
+              </a:ext>
+            </a:extLst>
+          </p:cNvPr>
+          <p:cNvSpPr>
+            <a:spLocks noGrp="1"/>
+          </p:cNvSpPr>
+          <p:nvPr>
+            <p:ph type="sldNum" sz="quarter" idx="11"/>
+          </p:nvPr>
+        </p:nvSpPr>
+        <p:spPr/>
+        <p:txBody>
+          <a:bodyPr/>
+          <a:lstStyle/>
+          <a:p>
+            <a:pPr>
+              <a:defRPr/>
+            </a:pPr>
+            <a:fld id="{6E0AA622-F4CE-604D-A669-CD3D12FC535C}" type="slidenum">
+              <a:rPr lang="en-US" smtClean="0"/>
+              <a:pPr>
+                <a:defRPr/>
+              </a:pPr>
+              <a:t>7</a:t>
+            </a:fld>
+            <a:endParaRPr lang="en-US" dirty="0"/>
+          </a:p>
+        </p:txBody>
+      </p:sp>
+      <p:sp>
+        <p:nvSpPr>
+          <p:cNvPr id="3" name="TextBox 2">
+            <a:extLst>
+              <a:ext uri="{FF2B5EF4-FFF2-40B4-BE49-F238E27FC236}">
+                <a16:creationId xmlns:a16="http://schemas.microsoft.com/office/drawing/2014/main" id="{63D4F072-2C9D-465F-674E-540BC5E88BE3}"/>
+              </a:ext>
+            </a:extLst>
+          </p:cNvPr>
+          <p:cNvSpPr txBox="1"/>
+          <p:nvPr/>
+        </p:nvSpPr>
+        <p:spPr>
+          <a:xfrm>
+            <a:off x="381000" y="1158925"/>
+            <a:ext cx="8016766" cy="338554"/>
+          </a:xfrm>
+          <a:prstGeom prst="rect">
+            <a:avLst/>
+          </a:prstGeom>
+          <a:gradFill flip="none" rotWithShape="1">
+            <a:gsLst>
+              <a:gs pos="0">
+                <a:schemeClr val="bg1"/>
+              </a:gs>
+              <a:gs pos="74000">
+                <a:srgbClr val="FFE267"/>
+              </a:gs>
+              <a:gs pos="83000">
+                <a:srgbClr val="FFE267"/>
+              </a:gs>
+              <a:gs pos="100000">
+                <a:srgbClr val="FFE267"/>
+              </a:gs>
+            </a:gsLst>
+            <a:lin ang="10800000" scaled="1"/>
+            <a:tileRect/>
+          </a:gradFill>
+        </p:spPr>
+        <p:txBody>
+          <a:bodyPr wrap="square" rtlCol="0">
+            <a:spAutoFit/>
+          </a:bodyPr>
+          <a:lstStyle/>
+          <a:p>
+            <a:r>
+              <a:rPr lang="en-US" sz="1600" dirty="0"/>
+              <a:t>Backward substitution</a:t>
+            </a:r>
+          </a:p>
+        </p:txBody>
+      </p:sp>
+      <p:pic>
+        <p:nvPicPr>
+          <p:cNvPr id="5" name="Picture 4" descr="A screenshot of a math equation&#10;&#10;Description automatically generated">
+            <a:extLst>
+              <a:ext uri="{FF2B5EF4-FFF2-40B4-BE49-F238E27FC236}">
+                <a16:creationId xmlns:a16="http://schemas.microsoft.com/office/drawing/2014/main" id="{7D883AD3-5AC5-D532-5E6C-49D65F8FC5A2}"/>
+              </a:ext>
+            </a:extLst>
+          </p:cNvPr>
+          <p:cNvPicPr>
+            <a:picLocks noChangeAspect="1"/>
+          </p:cNvPicPr>
+          <p:nvPr/>
+        </p:nvPicPr>
+        <p:blipFill>
+          <a:blip r:embed="rId3"/>
+          <a:stretch>
+            <a:fillRect/>
+          </a:stretch>
+        </p:blipFill>
+        <p:spPr>
+          <a:xfrm>
+            <a:off x="614236" y="1954528"/>
+            <a:ext cx="7772400" cy="3744547"/>
+          </a:xfrm>
+          <a:prstGeom prst="rect">
+            <a:avLst/>
+          </a:prstGeom>
+        </p:spPr>
+      </p:pic>
+    </p:spTree>
+    <p:extLst>
+      <p:ext uri="{BB962C8B-B14F-4D97-AF65-F5344CB8AC3E}">
+        <p14:creationId xmlns:p14="http://schemas.microsoft.com/office/powerpoint/2010/main" val="2036394989"/>
       </p:ext>
     </p:extLst>
   </p:cSld>

</xml_diff>